<commit_message>
Updated presentation to add case study
</commit_message>
<xml_diff>
--- a/documentation/4_project_update.pptx
+++ b/documentation/4_project_update.pptx
@@ -8,6 +8,9 @@
     <p:sldId id="256" r:id="rId2"/>
     <p:sldId id="257" r:id="rId3"/>
     <p:sldId id="258" r:id="rId4"/>
+    <p:sldId id="259" r:id="rId5"/>
+    <p:sldId id="260" r:id="rId6"/>
+    <p:sldId id="261" r:id="rId7"/>
   </p:sldIdLst>
   <p:sldSz cx="12192000" cy="6858000"/>
   <p:notesSz cx="6858000" cy="9144000"/>
@@ -4026,19 +4029,7 @@
             </a:r>
             <a:r>
               <a:rPr lang="en-US" dirty="0" smtClean="0"/>
-              <a:t> </a:t>
-            </a:r>
-            <a:r>
-              <a:rPr lang="en-US" dirty="0" smtClean="0"/>
-              <a:t>Linear classifier </a:t>
-            </a:r>
-            <a:r>
-              <a:rPr lang="en-US" dirty="0" smtClean="0"/>
-              <a:t>to </a:t>
-            </a:r>
-            <a:r>
-              <a:rPr lang="en-US" dirty="0" smtClean="0"/>
-              <a:t>classify Gabs as hate, offensive or neither</a:t>
+              <a:t> Linear classifier to classify Gabs as hate, offensive or neither</a:t>
             </a:r>
           </a:p>
           <a:p>
@@ -4052,11 +4043,7 @@
             </a:r>
             <a:r>
               <a:rPr lang="en-US" dirty="0" smtClean="0"/>
-              <a:t> 18,562 Gabs collected using snowball </a:t>
-            </a:r>
-            <a:r>
-              <a:rPr lang="en-US" dirty="0" smtClean="0"/>
-              <a:t>methodology, 10,000 users (with metadata such as username, gabs, followers, following, </a:t>
+              <a:t> 18,562 Gabs collected using snowball methodology, 10,000 users (with metadata such as username, gabs, followers, following, </a:t>
             </a:r>
             <a:r>
               <a:rPr lang="en-US" dirty="0" err="1" smtClean="0"/>
@@ -4076,7 +4063,6 @@
               <a:rPr lang="en-US" dirty="0" smtClean="0"/>
               <a:t>etwork analysis</a:t>
             </a:r>
-            <a:endParaRPr lang="en-US" dirty="0" smtClean="0"/>
           </a:p>
           <a:p>
             <a:endParaRPr lang="en-US" dirty="0"/>
@@ -4368,7 +4354,11 @@
           <a:p>
             <a:r>
               <a:rPr lang="en-US" dirty="0" smtClean="0"/>
-              <a:t>Draft of final presentation</a:t>
+              <a:t>Draft of final </a:t>
+            </a:r>
+            <a:r>
+              <a:rPr lang="en-US" dirty="0" smtClean="0"/>
+              <a:t>poster</a:t>
             </a:r>
             <a:endParaRPr lang="en-US" dirty="0" smtClean="0"/>
           </a:p>
@@ -4432,25 +4422,137 @@
           <a:bodyPr/>
           <a:lstStyle/>
           <a:p>
-            <a:endParaRPr lang="en-US"/>
-          </a:p>
-        </p:txBody>
-      </p:sp>
-      <p:sp>
-        <p:nvSpPr>
-          <p:cNvPr id="3" name="Content Placeholder 2"/>
-          <p:cNvSpPr>
-            <a:spLocks noGrp="1"/>
-          </p:cNvSpPr>
+            <a:r>
+              <a:rPr lang="en-US" dirty="0" smtClean="0"/>
+              <a:t>Case Study </a:t>
+            </a:r>
+            <a:r>
+              <a:rPr lang="mr-IN" dirty="0" smtClean="0"/>
+              <a:t>–</a:t>
+            </a:r>
+            <a:r>
+              <a:rPr lang="en-US" dirty="0" smtClean="0"/>
+              <a:t> Robert Bowers</a:t>
+            </a:r>
+            <a:endParaRPr lang="en-US" dirty="0"/>
+          </a:p>
+        </p:txBody>
+      </p:sp>
+      <p:pic>
+        <p:nvPicPr>
+          <p:cNvPr id="9" name="Content Placeholder 8"/>
+          <p:cNvPicPr>
+            <a:picLocks noGrp="1" noChangeAspect="1"/>
+          </p:cNvPicPr>
           <p:nvPr>
             <p:ph idx="1"/>
           </p:nvPr>
-        </p:nvSpPr>
-        <p:spPr/>
-        <p:txBody>
-          <a:bodyPr/>
+        </p:nvPicPr>
+        <p:blipFill>
+          <a:blip r:embed="rId2">
+            <a:extLst>
+              <a:ext uri="{28A0092B-C50C-407E-A947-70E740481C1C}">
+                <a14:useLocalDpi xmlns:a14="http://schemas.microsoft.com/office/drawing/2010/main" val="0"/>
+              </a:ext>
+            </a:extLst>
+          </a:blip>
+          <a:stretch>
+            <a:fillRect/>
+          </a:stretch>
+        </p:blipFill>
+        <p:spPr>
+          <a:xfrm>
+            <a:off x="1353335" y="1933711"/>
+            <a:ext cx="4775200" cy="3581400"/>
+          </a:xfrm>
+        </p:spPr>
+      </p:pic>
+      <p:pic>
+        <p:nvPicPr>
+          <p:cNvPr id="10" name="Picture 9"/>
+          <p:cNvPicPr>
+            <a:picLocks noChangeAspect="1"/>
+          </p:cNvPicPr>
+          <p:nvPr/>
+        </p:nvPicPr>
+        <p:blipFill>
+          <a:blip r:embed="rId3">
+            <a:extLst>
+              <a:ext uri="{28A0092B-C50C-407E-A947-70E740481C1C}">
+                <a14:useLocalDpi xmlns:a14="http://schemas.microsoft.com/office/drawing/2010/main" val="0"/>
+              </a:ext>
+            </a:extLst>
+          </a:blip>
+          <a:stretch>
+            <a:fillRect/>
+          </a:stretch>
+        </p:blipFill>
+        <p:spPr>
+          <a:xfrm>
+            <a:off x="6470579" y="1933711"/>
+            <a:ext cx="4800172" cy="3600129"/>
+          </a:xfrm>
+          <a:prstGeom prst="rect">
+            <a:avLst/>
+          </a:prstGeom>
+        </p:spPr>
+      </p:pic>
+      <p:sp>
+        <p:nvSpPr>
+          <p:cNvPr id="11" name="TextBox 10"/>
+          <p:cNvSpPr txBox="1"/>
+          <p:nvPr/>
+        </p:nvSpPr>
+        <p:spPr>
+          <a:xfrm>
+            <a:off x="2929277" y="5533840"/>
+            <a:ext cx="1623316" cy="369332"/>
+          </a:xfrm>
+          <a:prstGeom prst="rect">
+            <a:avLst/>
+          </a:prstGeom>
+          <a:noFill/>
+        </p:spPr>
+        <p:txBody>
+          <a:bodyPr wrap="square" rtlCol="0">
+            <a:spAutoFit/>
+          </a:bodyPr>
           <a:lstStyle/>
           <a:p>
+            <a:r>
+              <a:rPr lang="en-US" dirty="0" smtClean="0"/>
+              <a:t>Robert Bowers</a:t>
+            </a:r>
+            <a:endParaRPr lang="en-US" dirty="0"/>
+          </a:p>
+        </p:txBody>
+      </p:sp>
+      <p:sp>
+        <p:nvSpPr>
+          <p:cNvPr id="12" name="TextBox 11"/>
+          <p:cNvSpPr txBox="1"/>
+          <p:nvPr/>
+        </p:nvSpPr>
+        <p:spPr>
+          <a:xfrm>
+            <a:off x="8310723" y="5533840"/>
+            <a:ext cx="1119883" cy="369332"/>
+          </a:xfrm>
+          <a:prstGeom prst="rect">
+            <a:avLst/>
+          </a:prstGeom>
+          <a:noFill/>
+        </p:spPr>
+        <p:txBody>
+          <a:bodyPr wrap="square" rtlCol="0">
+            <a:spAutoFit/>
+          </a:bodyPr>
+          <a:lstStyle/>
+          <a:p>
+            <a:r>
+              <a:rPr lang="en-US" smtClean="0"/>
+              <a:t>All of Gab</a:t>
+            </a:r>
             <a:endParaRPr lang="en-US"/>
           </a:p>
         </p:txBody>
@@ -4459,6 +4561,522 @@
     <p:extLst>
       <p:ext uri="{BB962C8B-B14F-4D97-AF65-F5344CB8AC3E}">
         <p14:creationId xmlns:p14="http://schemas.microsoft.com/office/powerpoint/2010/main" val="907622743"/>
+      </p:ext>
+    </p:extLst>
+  </p:cSld>
+  <p:clrMapOvr>
+    <a:masterClrMapping/>
+  </p:clrMapOvr>
+</p:sld>
+</file>
+
+<file path=ppt/slides/slide4.xml><?xml version="1.0" encoding="utf-8"?>
+<p:sld xmlns:a="http://schemas.openxmlformats.org/drawingml/2006/main" xmlns:r="http://schemas.openxmlformats.org/officeDocument/2006/relationships" xmlns:p="http://schemas.openxmlformats.org/presentationml/2006/main">
+  <p:cSld>
+    <p:spTree>
+      <p:nvGrpSpPr>
+        <p:cNvPr id="1" name=""/>
+        <p:cNvGrpSpPr/>
+        <p:nvPr/>
+      </p:nvGrpSpPr>
+      <p:grpSpPr>
+        <a:xfrm>
+          <a:off x="0" y="0"/>
+          <a:ext cx="0" cy="0"/>
+          <a:chOff x="0" y="0"/>
+          <a:chExt cx="0" cy="0"/>
+        </a:xfrm>
+      </p:grpSpPr>
+      <p:sp>
+        <p:nvSpPr>
+          <p:cNvPr id="2" name="Title 1"/>
+          <p:cNvSpPr>
+            <a:spLocks noGrp="1"/>
+          </p:cNvSpPr>
+          <p:nvPr>
+            <p:ph type="title"/>
+          </p:nvPr>
+        </p:nvSpPr>
+        <p:spPr/>
+        <p:txBody>
+          <a:bodyPr/>
+          <a:lstStyle/>
+          <a:p>
+            <a:r>
+              <a:rPr lang="en-US" dirty="0" smtClean="0"/>
+              <a:t>Hate words</a:t>
+            </a:r>
+            <a:endParaRPr lang="en-US" dirty="0"/>
+          </a:p>
+        </p:txBody>
+      </p:sp>
+      <p:pic>
+        <p:nvPicPr>
+          <p:cNvPr id="4" name="Content Placeholder 3"/>
+          <p:cNvPicPr>
+            <a:picLocks noGrp="1" noChangeAspect="1"/>
+          </p:cNvPicPr>
+          <p:nvPr>
+            <p:ph idx="1"/>
+          </p:nvPr>
+        </p:nvPicPr>
+        <p:blipFill>
+          <a:blip r:embed="rId2">
+            <a:extLst>
+              <a:ext uri="{28A0092B-C50C-407E-A947-70E740481C1C}">
+                <a14:useLocalDpi xmlns:a14="http://schemas.microsoft.com/office/drawing/2010/main" val="0"/>
+              </a:ext>
+            </a:extLst>
+          </a:blip>
+          <a:stretch>
+            <a:fillRect/>
+          </a:stretch>
+        </p:blipFill>
+        <p:spPr>
+          <a:xfrm>
+            <a:off x="1099335" y="1894297"/>
+            <a:ext cx="5363110" cy="3575407"/>
+          </a:xfrm>
+        </p:spPr>
+      </p:pic>
+      <p:pic>
+        <p:nvPicPr>
+          <p:cNvPr id="5" name="Picture 4"/>
+          <p:cNvPicPr>
+            <a:picLocks noChangeAspect="1"/>
+          </p:cNvPicPr>
+          <p:nvPr/>
+        </p:nvPicPr>
+        <p:blipFill>
+          <a:blip r:embed="rId3">
+            <a:extLst>
+              <a:ext uri="{28A0092B-C50C-407E-A947-70E740481C1C}">
+                <a14:useLocalDpi xmlns:a14="http://schemas.microsoft.com/office/drawing/2010/main" val="0"/>
+              </a:ext>
+            </a:extLst>
+          </a:blip>
+          <a:stretch>
+            <a:fillRect/>
+          </a:stretch>
+        </p:blipFill>
+        <p:spPr>
+          <a:xfrm>
+            <a:off x="6462445" y="1894297"/>
+            <a:ext cx="5378521" cy="3585681"/>
+          </a:xfrm>
+          <a:prstGeom prst="rect">
+            <a:avLst/>
+          </a:prstGeom>
+        </p:spPr>
+      </p:pic>
+      <p:sp>
+        <p:nvSpPr>
+          <p:cNvPr id="6" name="TextBox 5"/>
+          <p:cNvSpPr txBox="1"/>
+          <p:nvPr/>
+        </p:nvSpPr>
+        <p:spPr>
+          <a:xfrm>
+            <a:off x="2969232" y="5469704"/>
+            <a:ext cx="1623316" cy="369332"/>
+          </a:xfrm>
+          <a:prstGeom prst="rect">
+            <a:avLst/>
+          </a:prstGeom>
+          <a:noFill/>
+        </p:spPr>
+        <p:txBody>
+          <a:bodyPr wrap="square" rtlCol="0">
+            <a:spAutoFit/>
+          </a:bodyPr>
+          <a:lstStyle/>
+          <a:p>
+            <a:r>
+              <a:rPr lang="en-US" dirty="0" smtClean="0"/>
+              <a:t>Robert Bowers</a:t>
+            </a:r>
+            <a:endParaRPr lang="en-US" dirty="0"/>
+          </a:p>
+        </p:txBody>
+      </p:sp>
+      <p:sp>
+        <p:nvSpPr>
+          <p:cNvPr id="7" name="TextBox 6"/>
+          <p:cNvSpPr txBox="1"/>
+          <p:nvPr/>
+        </p:nvSpPr>
+        <p:spPr>
+          <a:xfrm>
+            <a:off x="8591763" y="5483830"/>
+            <a:ext cx="1119883" cy="369332"/>
+          </a:xfrm>
+          <a:prstGeom prst="rect">
+            <a:avLst/>
+          </a:prstGeom>
+          <a:noFill/>
+        </p:spPr>
+        <p:txBody>
+          <a:bodyPr wrap="square" rtlCol="0">
+            <a:spAutoFit/>
+          </a:bodyPr>
+          <a:lstStyle/>
+          <a:p>
+            <a:r>
+              <a:rPr lang="en-US" smtClean="0"/>
+              <a:t>All of Gab</a:t>
+            </a:r>
+            <a:endParaRPr lang="en-US"/>
+          </a:p>
+        </p:txBody>
+      </p:sp>
+    </p:spTree>
+    <p:extLst>
+      <p:ext uri="{BB962C8B-B14F-4D97-AF65-F5344CB8AC3E}">
+        <p14:creationId xmlns:p14="http://schemas.microsoft.com/office/powerpoint/2010/main" val="1760374666"/>
+      </p:ext>
+    </p:extLst>
+  </p:cSld>
+  <p:clrMapOvr>
+    <a:masterClrMapping/>
+  </p:clrMapOvr>
+</p:sld>
+</file>
+
+<file path=ppt/slides/slide5.xml><?xml version="1.0" encoding="utf-8"?>
+<p:sld xmlns:a="http://schemas.openxmlformats.org/drawingml/2006/main" xmlns:r="http://schemas.openxmlformats.org/officeDocument/2006/relationships" xmlns:p="http://schemas.openxmlformats.org/presentationml/2006/main">
+  <p:cSld>
+    <p:spTree>
+      <p:nvGrpSpPr>
+        <p:cNvPr id="1" name=""/>
+        <p:cNvGrpSpPr/>
+        <p:nvPr/>
+      </p:nvGrpSpPr>
+      <p:grpSpPr>
+        <a:xfrm>
+          <a:off x="0" y="0"/>
+          <a:ext cx="0" cy="0"/>
+          <a:chOff x="0" y="0"/>
+          <a:chExt cx="0" cy="0"/>
+        </a:xfrm>
+      </p:grpSpPr>
+      <p:sp>
+        <p:nvSpPr>
+          <p:cNvPr id="2" name="Title 1"/>
+          <p:cNvSpPr>
+            <a:spLocks noGrp="1"/>
+          </p:cNvSpPr>
+          <p:nvPr>
+            <p:ph type="title"/>
+          </p:nvPr>
+        </p:nvSpPr>
+        <p:spPr/>
+        <p:txBody>
+          <a:bodyPr/>
+          <a:lstStyle/>
+          <a:p>
+            <a:r>
+              <a:rPr lang="en-US" dirty="0" smtClean="0"/>
+              <a:t>Offensive words</a:t>
+            </a:r>
+            <a:endParaRPr lang="en-US" dirty="0"/>
+          </a:p>
+        </p:txBody>
+      </p:sp>
+      <p:pic>
+        <p:nvPicPr>
+          <p:cNvPr id="4" name="Content Placeholder 3"/>
+          <p:cNvPicPr>
+            <a:picLocks noGrp="1" noChangeAspect="1"/>
+          </p:cNvPicPr>
+          <p:nvPr>
+            <p:ph idx="1"/>
+          </p:nvPr>
+        </p:nvPicPr>
+        <p:blipFill>
+          <a:blip r:embed="rId2">
+            <a:extLst>
+              <a:ext uri="{28A0092B-C50C-407E-A947-70E740481C1C}">
+                <a14:useLocalDpi xmlns:a14="http://schemas.microsoft.com/office/drawing/2010/main" val="0"/>
+              </a:ext>
+            </a:extLst>
+          </a:blip>
+          <a:stretch>
+            <a:fillRect/>
+          </a:stretch>
+        </p:blipFill>
+        <p:spPr>
+          <a:xfrm>
+            <a:off x="804595" y="1667981"/>
+            <a:ext cx="5670906" cy="3780604"/>
+          </a:xfrm>
+        </p:spPr>
+      </p:pic>
+      <p:pic>
+        <p:nvPicPr>
+          <p:cNvPr id="6" name="Picture 5"/>
+          <p:cNvPicPr>
+            <a:picLocks noChangeAspect="1"/>
+          </p:cNvPicPr>
+          <p:nvPr/>
+        </p:nvPicPr>
+        <p:blipFill>
+          <a:blip r:embed="rId3">
+            <a:extLst>
+              <a:ext uri="{28A0092B-C50C-407E-A947-70E740481C1C}">
+                <a14:useLocalDpi xmlns:a14="http://schemas.microsoft.com/office/drawing/2010/main" val="0"/>
+              </a:ext>
+            </a:extLst>
+          </a:blip>
+          <a:stretch>
+            <a:fillRect/>
+          </a:stretch>
+        </p:blipFill>
+        <p:spPr>
+          <a:xfrm>
+            <a:off x="6408078" y="1667981"/>
+            <a:ext cx="5670906" cy="3780604"/>
+          </a:xfrm>
+          <a:prstGeom prst="rect">
+            <a:avLst/>
+          </a:prstGeom>
+        </p:spPr>
+      </p:pic>
+      <p:sp>
+        <p:nvSpPr>
+          <p:cNvPr id="7" name="TextBox 6"/>
+          <p:cNvSpPr txBox="1"/>
+          <p:nvPr/>
+        </p:nvSpPr>
+        <p:spPr>
+          <a:xfrm>
+            <a:off x="2828390" y="5463282"/>
+            <a:ext cx="1623316" cy="369332"/>
+          </a:xfrm>
+          <a:prstGeom prst="rect">
+            <a:avLst/>
+          </a:prstGeom>
+          <a:noFill/>
+        </p:spPr>
+        <p:txBody>
+          <a:bodyPr wrap="square" rtlCol="0">
+            <a:spAutoFit/>
+          </a:bodyPr>
+          <a:lstStyle/>
+          <a:p>
+            <a:r>
+              <a:rPr lang="en-US" dirty="0" smtClean="0"/>
+              <a:t>Robert Bowers</a:t>
+            </a:r>
+            <a:endParaRPr lang="en-US" dirty="0"/>
+          </a:p>
+        </p:txBody>
+      </p:sp>
+      <p:sp>
+        <p:nvSpPr>
+          <p:cNvPr id="8" name="TextBox 7"/>
+          <p:cNvSpPr txBox="1"/>
+          <p:nvPr/>
+        </p:nvSpPr>
+        <p:spPr>
+          <a:xfrm>
+            <a:off x="8683589" y="5479978"/>
+            <a:ext cx="1119883" cy="369332"/>
+          </a:xfrm>
+          <a:prstGeom prst="rect">
+            <a:avLst/>
+          </a:prstGeom>
+          <a:noFill/>
+        </p:spPr>
+        <p:txBody>
+          <a:bodyPr wrap="square" rtlCol="0">
+            <a:spAutoFit/>
+          </a:bodyPr>
+          <a:lstStyle/>
+          <a:p>
+            <a:r>
+              <a:rPr lang="en-US" smtClean="0"/>
+              <a:t>All of Gab</a:t>
+            </a:r>
+            <a:endParaRPr lang="en-US"/>
+          </a:p>
+        </p:txBody>
+      </p:sp>
+    </p:spTree>
+    <p:extLst>
+      <p:ext uri="{BB962C8B-B14F-4D97-AF65-F5344CB8AC3E}">
+        <p14:creationId xmlns:p14="http://schemas.microsoft.com/office/powerpoint/2010/main" val="700850922"/>
+      </p:ext>
+    </p:extLst>
+  </p:cSld>
+  <p:clrMapOvr>
+    <a:masterClrMapping/>
+  </p:clrMapOvr>
+</p:sld>
+</file>
+
+<file path=ppt/slides/slide6.xml><?xml version="1.0" encoding="utf-8"?>
+<p:sld xmlns:a="http://schemas.openxmlformats.org/drawingml/2006/main" xmlns:r="http://schemas.openxmlformats.org/officeDocument/2006/relationships" xmlns:p="http://schemas.openxmlformats.org/presentationml/2006/main">
+  <p:cSld>
+    <p:spTree>
+      <p:nvGrpSpPr>
+        <p:cNvPr id="1" name=""/>
+        <p:cNvGrpSpPr/>
+        <p:nvPr/>
+      </p:nvGrpSpPr>
+      <p:grpSpPr>
+        <a:xfrm>
+          <a:off x="0" y="0"/>
+          <a:ext cx="0" cy="0"/>
+          <a:chOff x="0" y="0"/>
+          <a:chExt cx="0" cy="0"/>
+        </a:xfrm>
+      </p:grpSpPr>
+      <p:sp>
+        <p:nvSpPr>
+          <p:cNvPr id="2" name="Title 1"/>
+          <p:cNvSpPr>
+            <a:spLocks noGrp="1"/>
+          </p:cNvSpPr>
+          <p:nvPr>
+            <p:ph type="title"/>
+          </p:nvPr>
+        </p:nvSpPr>
+        <p:spPr/>
+        <p:txBody>
+          <a:bodyPr/>
+          <a:lstStyle/>
+          <a:p>
+            <a:r>
+              <a:rPr lang="en-US" dirty="0" smtClean="0"/>
+              <a:t>Neutral words</a:t>
+            </a:r>
+            <a:endParaRPr lang="en-US" dirty="0"/>
+          </a:p>
+        </p:txBody>
+      </p:sp>
+      <p:pic>
+        <p:nvPicPr>
+          <p:cNvPr id="4" name="Content Placeholder 3"/>
+          <p:cNvPicPr>
+            <a:picLocks noGrp="1" noChangeAspect="1"/>
+          </p:cNvPicPr>
+          <p:nvPr>
+            <p:ph idx="1"/>
+          </p:nvPr>
+        </p:nvPicPr>
+        <p:blipFill>
+          <a:blip r:embed="rId2">
+            <a:extLst>
+              <a:ext uri="{28A0092B-C50C-407E-A947-70E740481C1C}">
+                <a14:useLocalDpi xmlns:a14="http://schemas.microsoft.com/office/drawing/2010/main" val="0"/>
+              </a:ext>
+            </a:extLst>
+          </a:blip>
+          <a:stretch>
+            <a:fillRect/>
+          </a:stretch>
+        </p:blipFill>
+        <p:spPr>
+          <a:xfrm>
+            <a:off x="773702" y="1946954"/>
+            <a:ext cx="5969000" cy="3581400"/>
+          </a:xfrm>
+        </p:spPr>
+      </p:pic>
+      <p:pic>
+        <p:nvPicPr>
+          <p:cNvPr id="5" name="Picture 4"/>
+          <p:cNvPicPr>
+            <a:picLocks noChangeAspect="1"/>
+          </p:cNvPicPr>
+          <p:nvPr/>
+        </p:nvPicPr>
+        <p:blipFill>
+          <a:blip r:embed="rId3">
+            <a:extLst>
+              <a:ext uri="{28A0092B-C50C-407E-A947-70E740481C1C}">
+                <a14:useLocalDpi xmlns:a14="http://schemas.microsoft.com/office/drawing/2010/main" val="0"/>
+              </a:ext>
+            </a:extLst>
+          </a:blip>
+          <a:stretch>
+            <a:fillRect/>
+          </a:stretch>
+        </p:blipFill>
+        <p:spPr>
+          <a:xfrm>
+            <a:off x="5904358" y="1946954"/>
+            <a:ext cx="5968999" cy="3581400"/>
+          </a:xfrm>
+          <a:prstGeom prst="rect">
+            <a:avLst/>
+          </a:prstGeom>
+        </p:spPr>
+      </p:pic>
+      <p:sp>
+        <p:nvSpPr>
+          <p:cNvPr id="6" name="TextBox 5"/>
+          <p:cNvSpPr txBox="1"/>
+          <p:nvPr/>
+        </p:nvSpPr>
+        <p:spPr>
+          <a:xfrm>
+            <a:off x="2828390" y="5463282"/>
+            <a:ext cx="1623316" cy="369332"/>
+          </a:xfrm>
+          <a:prstGeom prst="rect">
+            <a:avLst/>
+          </a:prstGeom>
+          <a:noFill/>
+        </p:spPr>
+        <p:txBody>
+          <a:bodyPr wrap="square" rtlCol="0">
+            <a:spAutoFit/>
+          </a:bodyPr>
+          <a:lstStyle/>
+          <a:p>
+            <a:r>
+              <a:rPr lang="en-US" dirty="0" smtClean="0"/>
+              <a:t>Robert Bowers</a:t>
+            </a:r>
+            <a:endParaRPr lang="en-US" dirty="0"/>
+          </a:p>
+        </p:txBody>
+      </p:sp>
+      <p:sp>
+        <p:nvSpPr>
+          <p:cNvPr id="7" name="TextBox 6"/>
+          <p:cNvSpPr txBox="1"/>
+          <p:nvPr/>
+        </p:nvSpPr>
+        <p:spPr>
+          <a:xfrm>
+            <a:off x="8683589" y="5479978"/>
+            <a:ext cx="1119883" cy="369332"/>
+          </a:xfrm>
+          <a:prstGeom prst="rect">
+            <a:avLst/>
+          </a:prstGeom>
+          <a:noFill/>
+        </p:spPr>
+        <p:txBody>
+          <a:bodyPr wrap="square" rtlCol="0">
+            <a:spAutoFit/>
+          </a:bodyPr>
+          <a:lstStyle/>
+          <a:p>
+            <a:r>
+              <a:rPr lang="en-US" smtClean="0"/>
+              <a:t>All of Gab</a:t>
+            </a:r>
+            <a:endParaRPr lang="en-US"/>
+          </a:p>
+        </p:txBody>
+      </p:sp>
+    </p:spTree>
+    <p:extLst>
+      <p:ext uri="{BB962C8B-B14F-4D97-AF65-F5344CB8AC3E}">
+        <p14:creationId xmlns:p14="http://schemas.microsoft.com/office/powerpoint/2010/main" val="1779387036"/>
       </p:ext>
     </p:extLst>
   </p:cSld>

</xml_diff>